<commit_message>
Some slight word corrections
</commit_message>
<xml_diff>
--- a/figs/figs.pptx
+++ b/figs/figs.pptx
@@ -7,6 +7,8 @@
   <p:sldIdLst>
     <p:sldId id="256" r:id="rId2"/>
     <p:sldId id="257" r:id="rId3"/>
+    <p:sldId id="280" r:id="rId4"/>
+    <p:sldId id="282" r:id="rId5"/>
   </p:sldIdLst>
   <p:sldSz cx="12192000" cy="6858000"/>
   <p:notesSz cx="6858000" cy="9144000"/>
@@ -105,7 +107,1107 @@
       </a:defRPr>
     </a:lvl9pPr>
   </p:defaultTextStyle>
+  <p:extLst>
+    <p:ext uri="{EFAFB233-063F-42B5-8137-9DF3F51BA10A}">
+      <p15:sldGuideLst xmlns:p15="http://schemas.microsoft.com/office/powerpoint/2012/main"/>
+    </p:ext>
+  </p:extLst>
 </p:presentation>
+</file>
+
+<file path=ppt/charts/chart1.xml><?xml version="1.0" encoding="utf-8"?>
+<c:chartSpace xmlns:c="http://schemas.openxmlformats.org/drawingml/2006/chart" xmlns:a="http://schemas.openxmlformats.org/drawingml/2006/main" xmlns:r="http://schemas.openxmlformats.org/officeDocument/2006/relationships" xmlns:c16r2="http://schemas.microsoft.com/office/drawing/2015/06/chart">
+  <c:date1904 val="0"/>
+  <c:lang val="en-US"/>
+  <c:roundedCorners val="0"/>
+  <mc:AlternateContent xmlns:mc="http://schemas.openxmlformats.org/markup-compatibility/2006">
+    <mc:Choice xmlns:c14="http://schemas.microsoft.com/office/drawing/2007/8/2/chart" Requires="c14">
+      <c14:style val="102"/>
+    </mc:Choice>
+    <mc:Fallback>
+      <c:style val="2"/>
+    </mc:Fallback>
+  </mc:AlternateContent>
+  <c:chart>
+    <c:autoTitleDeleted val="1"/>
+    <c:plotArea>
+      <c:layout>
+        <c:manualLayout>
+          <c:layoutTarget val="inner"/>
+          <c:xMode val="edge"/>
+          <c:yMode val="edge"/>
+          <c:x val="0.13733622578830804"/>
+          <c:y val="5.0925925925925923E-2"/>
+          <c:w val="0.81543693060609135"/>
+          <c:h val="0.79500729075532228"/>
+        </c:manualLayout>
+      </c:layout>
+      <c:scatterChart>
+        <c:scatterStyle val="smoothMarker"/>
+        <c:varyColors val="0"/>
+        <c:ser>
+          <c:idx val="0"/>
+          <c:order val="0"/>
+          <c:tx>
+            <c:strRef>
+              <c:f>Sheet1!$H$15</c:f>
+              <c:strCache>
+                <c:ptCount val="1"/>
+                <c:pt idx="0">
+                  <c:v>OTM-MPI Rate</c:v>
+                </c:pt>
+              </c:strCache>
+            </c:strRef>
+          </c:tx>
+          <c:spPr>
+            <a:ln w="28575" cap="rnd">
+              <a:solidFill>
+                <a:srgbClr val="C00000"/>
+              </a:solidFill>
+              <a:round/>
+            </a:ln>
+            <a:effectLst/>
+          </c:spPr>
+          <c:marker>
+            <c:symbol val="none"/>
+          </c:marker>
+          <c:xVal>
+            <c:numRef>
+              <c:f>Sheet1!$G$16:$G$25</c:f>
+              <c:numCache>
+                <c:formatCode>General</c:formatCode>
+                <c:ptCount val="10"/>
+                <c:pt idx="0">
+                  <c:v>2</c:v>
+                </c:pt>
+                <c:pt idx="1">
+                  <c:v>4</c:v>
+                </c:pt>
+                <c:pt idx="2">
+                  <c:v>8</c:v>
+                </c:pt>
+                <c:pt idx="3">
+                  <c:v>16</c:v>
+                </c:pt>
+                <c:pt idx="4">
+                  <c:v>32</c:v>
+                </c:pt>
+                <c:pt idx="5">
+                  <c:v>64</c:v>
+                </c:pt>
+                <c:pt idx="6">
+                  <c:v>128</c:v>
+                </c:pt>
+                <c:pt idx="7">
+                  <c:v>256</c:v>
+                </c:pt>
+                <c:pt idx="8">
+                  <c:v>512</c:v>
+                </c:pt>
+                <c:pt idx="9">
+                  <c:v>1024</c:v>
+                </c:pt>
+              </c:numCache>
+            </c:numRef>
+          </c:xVal>
+          <c:yVal>
+            <c:numRef>
+              <c:f>Sheet1!$H$16:$H$25</c:f>
+              <c:numCache>
+                <c:formatCode>General</c:formatCode>
+                <c:ptCount val="10"/>
+                <c:pt idx="0">
+                  <c:v>1.212847945464719E-4</c:v>
+                </c:pt>
+                <c:pt idx="1">
+                  <c:v>5.708340464644152E-4</c:v>
+                </c:pt>
+                <c:pt idx="2">
+                  <c:v>1.2418145267696803E-3</c:v>
+                </c:pt>
+                <c:pt idx="3">
+                  <c:v>2.5622386996946066E-3</c:v>
+                </c:pt>
+                <c:pt idx="4">
+                  <c:v>5.0554353766223518E-3</c:v>
+                </c:pt>
+                <c:pt idx="5">
+                  <c:v>8.0666108457196142E-3</c:v>
+                </c:pt>
+                <c:pt idx="6">
+                  <c:v>1.4018246149187783E-2</c:v>
+                </c:pt>
+                <c:pt idx="7">
+                  <c:v>2.4511005441443207E-2</c:v>
+                </c:pt>
+                <c:pt idx="8">
+                  <c:v>4.0175970751893296E-2</c:v>
+                </c:pt>
+                <c:pt idx="9">
+                  <c:v>5.7788770486119134E-2</c:v>
+                </c:pt>
+              </c:numCache>
+            </c:numRef>
+          </c:yVal>
+          <c:smooth val="1"/>
+          <c:extLst>
+            <c:ext xmlns:c16="http://schemas.microsoft.com/office/drawing/2014/chart" uri="{C3380CC4-5D6E-409C-BE32-E72D297353CC}">
+              <c16:uniqueId val="{00000000-1429-A141-8630-213B97466249}"/>
+            </c:ext>
+          </c:extLst>
+        </c:ser>
+        <c:ser>
+          <c:idx val="1"/>
+          <c:order val="1"/>
+          <c:tx>
+            <c:strRef>
+              <c:f>Sheet1!$I$15</c:f>
+              <c:strCache>
+                <c:ptCount val="1"/>
+                <c:pt idx="0">
+                  <c:v>Ideal Rate</c:v>
+                </c:pt>
+              </c:strCache>
+            </c:strRef>
+          </c:tx>
+          <c:spPr>
+            <a:ln w="28575" cap="rnd">
+              <a:solidFill>
+                <a:srgbClr val="002060"/>
+              </a:solidFill>
+              <a:round/>
+            </a:ln>
+            <a:effectLst/>
+          </c:spPr>
+          <c:marker>
+            <c:symbol val="none"/>
+          </c:marker>
+          <c:xVal>
+            <c:numRef>
+              <c:f>Sheet1!$G$16:$G$25</c:f>
+              <c:numCache>
+                <c:formatCode>General</c:formatCode>
+                <c:ptCount val="10"/>
+                <c:pt idx="0">
+                  <c:v>2</c:v>
+                </c:pt>
+                <c:pt idx="1">
+                  <c:v>4</c:v>
+                </c:pt>
+                <c:pt idx="2">
+                  <c:v>8</c:v>
+                </c:pt>
+                <c:pt idx="3">
+                  <c:v>16</c:v>
+                </c:pt>
+                <c:pt idx="4">
+                  <c:v>32</c:v>
+                </c:pt>
+                <c:pt idx="5">
+                  <c:v>64</c:v>
+                </c:pt>
+                <c:pt idx="6">
+                  <c:v>128</c:v>
+                </c:pt>
+                <c:pt idx="7">
+                  <c:v>256</c:v>
+                </c:pt>
+                <c:pt idx="8">
+                  <c:v>512</c:v>
+                </c:pt>
+                <c:pt idx="9">
+                  <c:v>1024</c:v>
+                </c:pt>
+              </c:numCache>
+            </c:numRef>
+          </c:xVal>
+          <c:yVal>
+            <c:numRef>
+              <c:f>Sheet1!$I$16:$I$25</c:f>
+              <c:numCache>
+                <c:formatCode>General</c:formatCode>
+                <c:ptCount val="10"/>
+                <c:pt idx="0">
+                  <c:v>1.212847945464719E-4</c:v>
+                </c:pt>
+                <c:pt idx="1">
+                  <c:v>4.8513917818588759E-4</c:v>
+                </c:pt>
+                <c:pt idx="2">
+                  <c:v>9.7027835637177517E-4</c:v>
+                </c:pt>
+                <c:pt idx="3">
+                  <c:v>1.9405567127435503E-3</c:v>
+                </c:pt>
+                <c:pt idx="4">
+                  <c:v>3.8811134254871007E-3</c:v>
+                </c:pt>
+                <c:pt idx="5">
+                  <c:v>7.7622268509742014E-3</c:v>
+                </c:pt>
+                <c:pt idx="6">
+                  <c:v>1.5524453701948403E-2</c:v>
+                </c:pt>
+                <c:pt idx="7">
+                  <c:v>3.1048907403896805E-2</c:v>
+                </c:pt>
+                <c:pt idx="8">
+                  <c:v>6.2097814807793611E-2</c:v>
+                </c:pt>
+                <c:pt idx="9">
+                  <c:v>0.12419562961558722</c:v>
+                </c:pt>
+              </c:numCache>
+            </c:numRef>
+          </c:yVal>
+          <c:smooth val="1"/>
+          <c:extLst>
+            <c:ext xmlns:c16="http://schemas.microsoft.com/office/drawing/2014/chart" uri="{C3380CC4-5D6E-409C-BE32-E72D297353CC}">
+              <c16:uniqueId val="{00000001-1429-A141-8630-213B97466249}"/>
+            </c:ext>
+          </c:extLst>
+        </c:ser>
+        <c:dLbls>
+          <c:showLegendKey val="0"/>
+          <c:showVal val="0"/>
+          <c:showCatName val="0"/>
+          <c:showSerName val="0"/>
+          <c:showPercent val="0"/>
+          <c:showBubbleSize val="0"/>
+        </c:dLbls>
+        <c:axId val="787453983"/>
+        <c:axId val="784002271"/>
+      </c:scatterChart>
+      <c:valAx>
+        <c:axId val="787453983"/>
+        <c:scaling>
+          <c:orientation val="minMax"/>
+          <c:max val="1030"/>
+          <c:min val="0"/>
+        </c:scaling>
+        <c:delete val="0"/>
+        <c:axPos val="b"/>
+        <c:title>
+          <c:tx>
+            <c:rich>
+              <a:bodyPr rot="0" spcFirstLastPara="1" vertOverflow="ellipsis" vert="horz" wrap="square" anchor="ctr" anchorCtr="1"/>
+              <a:lstStyle/>
+              <a:p>
+                <a:pPr>
+                  <a:defRPr sz="1300" b="1" i="0" u="none" strike="noStrike" kern="1200" baseline="0">
+                    <a:solidFill>
+                      <a:schemeClr val="tx1"/>
+                    </a:solidFill>
+                    <a:latin typeface="+mn-lt"/>
+                    <a:ea typeface="+mn-ea"/>
+                    <a:cs typeface="+mn-cs"/>
+                  </a:defRPr>
+                </a:pPr>
+                <a:r>
+                  <a:rPr lang="en-US"/>
+                  <a:t>Number of MPI</a:t>
+                </a:r>
+              </a:p>
+            </c:rich>
+          </c:tx>
+          <c:overlay val="0"/>
+          <c:spPr>
+            <a:noFill/>
+            <a:ln>
+              <a:noFill/>
+            </a:ln>
+            <a:effectLst/>
+          </c:spPr>
+          <c:txPr>
+            <a:bodyPr rot="0" spcFirstLastPara="1" vertOverflow="ellipsis" vert="horz" wrap="square" anchor="ctr" anchorCtr="1"/>
+            <a:lstStyle/>
+            <a:p>
+              <a:pPr>
+                <a:defRPr sz="1300" b="1" i="0" u="none" strike="noStrike" kern="1200" baseline="0">
+                  <a:solidFill>
+                    <a:schemeClr val="tx1"/>
+                  </a:solidFill>
+                  <a:latin typeface="+mn-lt"/>
+                  <a:ea typeface="+mn-ea"/>
+                  <a:cs typeface="+mn-cs"/>
+                </a:defRPr>
+              </a:pPr>
+              <a:endParaRPr lang="en-US"/>
+            </a:p>
+          </c:txPr>
+        </c:title>
+        <c:numFmt formatCode="General" sourceLinked="1"/>
+        <c:majorTickMark val="none"/>
+        <c:minorTickMark val="none"/>
+        <c:tickLblPos val="nextTo"/>
+        <c:spPr>
+          <a:noFill/>
+          <a:ln w="9525" cap="flat" cmpd="sng" algn="ctr">
+            <a:solidFill>
+              <a:schemeClr val="tx1">
+                <a:lumMod val="25000"/>
+                <a:lumOff val="75000"/>
+              </a:schemeClr>
+            </a:solidFill>
+            <a:round/>
+          </a:ln>
+          <a:effectLst/>
+        </c:spPr>
+        <c:txPr>
+          <a:bodyPr rot="-60000000" spcFirstLastPara="1" vertOverflow="ellipsis" vert="horz" wrap="square" anchor="ctr" anchorCtr="1"/>
+          <a:lstStyle/>
+          <a:p>
+            <a:pPr>
+              <a:defRPr sz="1300" b="1" i="0" u="none" strike="noStrike" kern="1200" baseline="0">
+                <a:solidFill>
+                  <a:schemeClr val="tx1"/>
+                </a:solidFill>
+                <a:latin typeface="+mn-lt"/>
+                <a:ea typeface="+mn-ea"/>
+                <a:cs typeface="+mn-cs"/>
+              </a:defRPr>
+            </a:pPr>
+            <a:endParaRPr lang="en-US"/>
+          </a:p>
+        </c:txPr>
+        <c:crossAx val="784002271"/>
+        <c:crosses val="autoZero"/>
+        <c:crossBetween val="midCat"/>
+      </c:valAx>
+      <c:valAx>
+        <c:axId val="784002271"/>
+        <c:scaling>
+          <c:orientation val="minMax"/>
+        </c:scaling>
+        <c:delete val="0"/>
+        <c:axPos val="l"/>
+        <c:title>
+          <c:tx>
+            <c:rich>
+              <a:bodyPr rot="-5400000" spcFirstLastPara="1" vertOverflow="ellipsis" vert="horz" wrap="square" anchor="ctr" anchorCtr="1"/>
+              <a:lstStyle/>
+              <a:p>
+                <a:pPr>
+                  <a:defRPr sz="1300" b="1" i="0" u="none" strike="noStrike" kern="1200" baseline="0">
+                    <a:solidFill>
+                      <a:schemeClr val="tx1"/>
+                    </a:solidFill>
+                    <a:latin typeface="+mn-lt"/>
+                    <a:ea typeface="+mn-ea"/>
+                    <a:cs typeface="+mn-cs"/>
+                  </a:defRPr>
+                </a:pPr>
+                <a:r>
+                  <a:rPr lang="en-US"/>
+                  <a:t>Simulations/s</a:t>
+                </a:r>
+              </a:p>
+            </c:rich>
+          </c:tx>
+          <c:overlay val="0"/>
+          <c:spPr>
+            <a:noFill/>
+            <a:ln>
+              <a:noFill/>
+            </a:ln>
+            <a:effectLst/>
+          </c:spPr>
+          <c:txPr>
+            <a:bodyPr rot="-5400000" spcFirstLastPara="1" vertOverflow="ellipsis" vert="horz" wrap="square" anchor="ctr" anchorCtr="1"/>
+            <a:lstStyle/>
+            <a:p>
+              <a:pPr>
+                <a:defRPr sz="1300" b="1" i="0" u="none" strike="noStrike" kern="1200" baseline="0">
+                  <a:solidFill>
+                    <a:schemeClr val="tx1"/>
+                  </a:solidFill>
+                  <a:latin typeface="+mn-lt"/>
+                  <a:ea typeface="+mn-ea"/>
+                  <a:cs typeface="+mn-cs"/>
+                </a:defRPr>
+              </a:pPr>
+              <a:endParaRPr lang="en-US"/>
+            </a:p>
+          </c:txPr>
+        </c:title>
+        <c:numFmt formatCode="General" sourceLinked="1"/>
+        <c:majorTickMark val="none"/>
+        <c:minorTickMark val="none"/>
+        <c:tickLblPos val="nextTo"/>
+        <c:spPr>
+          <a:noFill/>
+          <a:ln w="9525" cap="flat" cmpd="sng" algn="ctr">
+            <a:solidFill>
+              <a:schemeClr val="tx1">
+                <a:lumMod val="25000"/>
+                <a:lumOff val="75000"/>
+              </a:schemeClr>
+            </a:solidFill>
+            <a:round/>
+          </a:ln>
+          <a:effectLst/>
+        </c:spPr>
+        <c:txPr>
+          <a:bodyPr rot="-60000000" spcFirstLastPara="1" vertOverflow="ellipsis" vert="horz" wrap="square" anchor="ctr" anchorCtr="1"/>
+          <a:lstStyle/>
+          <a:p>
+            <a:pPr>
+              <a:defRPr sz="1300" b="1" i="0" u="none" strike="noStrike" kern="1200" baseline="0">
+                <a:solidFill>
+                  <a:schemeClr val="tx1"/>
+                </a:solidFill>
+                <a:latin typeface="+mn-lt"/>
+                <a:ea typeface="+mn-ea"/>
+                <a:cs typeface="+mn-cs"/>
+              </a:defRPr>
+            </a:pPr>
+            <a:endParaRPr lang="en-US"/>
+          </a:p>
+        </c:txPr>
+        <c:crossAx val="787453983"/>
+        <c:crosses val="autoZero"/>
+        <c:crossBetween val="midCat"/>
+      </c:valAx>
+      <c:spPr>
+        <a:noFill/>
+        <a:ln>
+          <a:solidFill>
+            <a:schemeClr val="tx1"/>
+          </a:solidFill>
+        </a:ln>
+        <a:effectLst/>
+      </c:spPr>
+    </c:plotArea>
+    <c:legend>
+      <c:legendPos val="b"/>
+      <c:layout>
+        <c:manualLayout>
+          <c:xMode val="edge"/>
+          <c:yMode val="edge"/>
+          <c:x val="0.15394412371042077"/>
+          <c:y val="6.6881018990454288E-2"/>
+          <c:w val="0.296143481690888"/>
+          <c:h val="0.13327405940637052"/>
+        </c:manualLayout>
+      </c:layout>
+      <c:overlay val="0"/>
+      <c:spPr>
+        <a:noFill/>
+        <a:ln>
+          <a:noFill/>
+        </a:ln>
+        <a:effectLst/>
+      </c:spPr>
+      <c:txPr>
+        <a:bodyPr rot="0" spcFirstLastPara="1" vertOverflow="ellipsis" vert="horz" wrap="square" anchor="ctr" anchorCtr="1"/>
+        <a:lstStyle/>
+        <a:p>
+          <a:pPr>
+            <a:defRPr sz="1300" b="1" i="0" u="none" strike="noStrike" kern="1200" baseline="0">
+              <a:solidFill>
+                <a:schemeClr val="tx1"/>
+              </a:solidFill>
+              <a:latin typeface="+mn-lt"/>
+              <a:ea typeface="+mn-ea"/>
+              <a:cs typeface="+mn-cs"/>
+            </a:defRPr>
+          </a:pPr>
+          <a:endParaRPr lang="en-US"/>
+        </a:p>
+      </c:txPr>
+    </c:legend>
+    <c:plotVisOnly val="1"/>
+    <c:dispBlanksAs val="gap"/>
+    <c:extLst>
+      <c:ext xmlns:c16r3="http://schemas.microsoft.com/office/drawing/2017/03/chart" uri="{56B9EC1D-385E-4148-901F-78D8002777C0}">
+        <c16r3:dataDisplayOptions16>
+          <c16r3:dispNaAsBlank val="1"/>
+        </c16r3:dataDisplayOptions16>
+      </c:ext>
+    </c:extLst>
+    <c:showDLblsOverMax val="0"/>
+  </c:chart>
+  <c:spPr>
+    <a:noFill/>
+    <a:ln>
+      <a:noFill/>
+    </a:ln>
+    <a:effectLst/>
+  </c:spPr>
+  <c:txPr>
+    <a:bodyPr/>
+    <a:lstStyle/>
+    <a:p>
+      <a:pPr>
+        <a:defRPr sz="1300" b="1">
+          <a:solidFill>
+            <a:schemeClr val="tx1"/>
+          </a:solidFill>
+        </a:defRPr>
+      </a:pPr>
+      <a:endParaRPr lang="en-US"/>
+    </a:p>
+  </c:txPr>
+  <c:externalData r:id="rId3">
+    <c:autoUpdate val="0"/>
+  </c:externalData>
+</c:chartSpace>
+</file>
+
+<file path=ppt/charts/colors1.xml><?xml version="1.0" encoding="utf-8"?>
+<cs:colorStyle xmlns:cs="http://schemas.microsoft.com/office/drawing/2012/chartStyle" xmlns:a="http://schemas.openxmlformats.org/drawingml/2006/main" meth="cycle" id="10">
+  <a:schemeClr val="accent1"/>
+  <a:schemeClr val="accent2"/>
+  <a:schemeClr val="accent3"/>
+  <a:schemeClr val="accent4"/>
+  <a:schemeClr val="accent5"/>
+  <a:schemeClr val="accent6"/>
+  <cs:variation/>
+  <cs:variation>
+    <a:lumMod val="60000"/>
+  </cs:variation>
+  <cs:variation>
+    <a:lumMod val="80000"/>
+    <a:lumOff val="20000"/>
+  </cs:variation>
+  <cs:variation>
+    <a:lumMod val="80000"/>
+  </cs:variation>
+  <cs:variation>
+    <a:lumMod val="60000"/>
+    <a:lumOff val="40000"/>
+  </cs:variation>
+  <cs:variation>
+    <a:lumMod val="50000"/>
+  </cs:variation>
+  <cs:variation>
+    <a:lumMod val="70000"/>
+    <a:lumOff val="30000"/>
+  </cs:variation>
+  <cs:variation>
+    <a:lumMod val="70000"/>
+  </cs:variation>
+  <cs:variation>
+    <a:lumMod val="50000"/>
+    <a:lumOff val="50000"/>
+  </cs:variation>
+</cs:colorStyle>
+</file>
+
+<file path=ppt/charts/style1.xml><?xml version="1.0" encoding="utf-8"?>
+<cs:chartStyle xmlns:cs="http://schemas.microsoft.com/office/drawing/2012/chartStyle" xmlns:a="http://schemas.openxmlformats.org/drawingml/2006/main" id="240">
+  <cs:axisTitle>
+    <cs:lnRef idx="0"/>
+    <cs:fillRef idx="0"/>
+    <cs:effectRef idx="0"/>
+    <cs:fontRef idx="minor">
+      <a:schemeClr val="tx1">
+        <a:lumMod val="65000"/>
+        <a:lumOff val="35000"/>
+      </a:schemeClr>
+    </cs:fontRef>
+    <cs:defRPr sz="1000" kern="1200"/>
+  </cs:axisTitle>
+  <cs:categoryAxis>
+    <cs:lnRef idx="0"/>
+    <cs:fillRef idx="0"/>
+    <cs:effectRef idx="0"/>
+    <cs:fontRef idx="minor">
+      <a:schemeClr val="tx1">
+        <a:lumMod val="65000"/>
+        <a:lumOff val="35000"/>
+      </a:schemeClr>
+    </cs:fontRef>
+    <cs:spPr>
+      <a:ln w="9525" cap="flat" cmpd="sng" algn="ctr">
+        <a:solidFill>
+          <a:schemeClr val="tx1">
+            <a:lumMod val="25000"/>
+            <a:lumOff val="75000"/>
+          </a:schemeClr>
+        </a:solidFill>
+        <a:round/>
+      </a:ln>
+    </cs:spPr>
+    <cs:defRPr sz="900" kern="1200"/>
+  </cs:categoryAxis>
+  <cs:chartArea mods="allowNoFillOverride allowNoLineOverride">
+    <cs:lnRef idx="0"/>
+    <cs:fillRef idx="0"/>
+    <cs:effectRef idx="0"/>
+    <cs:fontRef idx="minor">
+      <a:schemeClr val="tx1"/>
+    </cs:fontRef>
+    <cs:spPr>
+      <a:solidFill>
+        <a:schemeClr val="bg1"/>
+      </a:solidFill>
+      <a:ln w="9525" cap="flat" cmpd="sng" algn="ctr">
+        <a:solidFill>
+          <a:schemeClr val="tx1">
+            <a:lumMod val="15000"/>
+            <a:lumOff val="85000"/>
+          </a:schemeClr>
+        </a:solidFill>
+        <a:round/>
+      </a:ln>
+    </cs:spPr>
+    <cs:defRPr sz="1000" kern="1200"/>
+  </cs:chartArea>
+  <cs:dataLabel>
+    <cs:lnRef idx="0"/>
+    <cs:fillRef idx="0"/>
+    <cs:effectRef idx="0"/>
+    <cs:fontRef idx="minor">
+      <a:schemeClr val="tx1">
+        <a:lumMod val="75000"/>
+        <a:lumOff val="25000"/>
+      </a:schemeClr>
+    </cs:fontRef>
+    <cs:defRPr sz="900" kern="1200"/>
+  </cs:dataLabel>
+  <cs:dataLabelCallout>
+    <cs:lnRef idx="0"/>
+    <cs:fillRef idx="0"/>
+    <cs:effectRef idx="0"/>
+    <cs:fontRef idx="minor">
+      <a:schemeClr val="dk1">
+        <a:lumMod val="65000"/>
+        <a:lumOff val="35000"/>
+      </a:schemeClr>
+    </cs:fontRef>
+    <cs:spPr>
+      <a:solidFill>
+        <a:schemeClr val="lt1"/>
+      </a:solidFill>
+      <a:ln>
+        <a:solidFill>
+          <a:schemeClr val="dk1">
+            <a:lumMod val="25000"/>
+            <a:lumOff val="75000"/>
+          </a:schemeClr>
+        </a:solidFill>
+      </a:ln>
+    </cs:spPr>
+    <cs:defRPr sz="900" kern="1200"/>
+    <cs:bodyPr rot="0" spcFirstLastPara="1" vertOverflow="clip" horzOverflow="clip" vert="horz" wrap="square" lIns="36576" tIns="18288" rIns="36576" bIns="18288" anchor="ctr" anchorCtr="1">
+      <a:spAutoFit/>
+    </cs:bodyPr>
+  </cs:dataLabelCallout>
+  <cs:dataPoint>
+    <cs:lnRef idx="0"/>
+    <cs:fillRef idx="1">
+      <cs:styleClr val="auto"/>
+    </cs:fillRef>
+    <cs:effectRef idx="0"/>
+    <cs:fontRef idx="minor">
+      <a:schemeClr val="tx1"/>
+    </cs:fontRef>
+  </cs:dataPoint>
+  <cs:dataPoint3D>
+    <cs:lnRef idx="0"/>
+    <cs:fillRef idx="1">
+      <cs:styleClr val="auto"/>
+    </cs:fillRef>
+    <cs:effectRef idx="0"/>
+    <cs:fontRef idx="minor">
+      <a:schemeClr val="tx1"/>
+    </cs:fontRef>
+  </cs:dataPoint3D>
+  <cs:dataPointLine>
+    <cs:lnRef idx="0">
+      <cs:styleClr val="auto"/>
+    </cs:lnRef>
+    <cs:fillRef idx="1"/>
+    <cs:effectRef idx="0"/>
+    <cs:fontRef idx="minor">
+      <a:schemeClr val="tx1"/>
+    </cs:fontRef>
+    <cs:spPr>
+      <a:ln w="19050" cap="rnd">
+        <a:solidFill>
+          <a:schemeClr val="phClr"/>
+        </a:solidFill>
+        <a:round/>
+      </a:ln>
+    </cs:spPr>
+  </cs:dataPointLine>
+  <cs:dataPointMarker>
+    <cs:lnRef idx="0">
+      <cs:styleClr val="auto"/>
+    </cs:lnRef>
+    <cs:fillRef idx="1">
+      <cs:styleClr val="auto"/>
+    </cs:fillRef>
+    <cs:effectRef idx="0"/>
+    <cs:fontRef idx="minor">
+      <a:schemeClr val="tx1"/>
+    </cs:fontRef>
+    <cs:spPr>
+      <a:ln w="9525">
+        <a:solidFill>
+          <a:schemeClr val="phClr"/>
+        </a:solidFill>
+      </a:ln>
+    </cs:spPr>
+  </cs:dataPointMarker>
+  <cs:dataPointMarkerLayout symbol="circle" size="5"/>
+  <cs:dataPointWireframe>
+    <cs:lnRef idx="0">
+      <cs:styleClr val="auto"/>
+    </cs:lnRef>
+    <cs:fillRef idx="0"/>
+    <cs:effectRef idx="0"/>
+    <cs:fontRef idx="minor">
+      <a:schemeClr val="dk1"/>
+    </cs:fontRef>
+    <cs:spPr>
+      <a:ln w="9525" cap="rnd">
+        <a:solidFill>
+          <a:schemeClr val="phClr"/>
+        </a:solidFill>
+        <a:round/>
+      </a:ln>
+    </cs:spPr>
+  </cs:dataPointWireframe>
+  <cs:dataTable>
+    <cs:lnRef idx="0"/>
+    <cs:fillRef idx="0"/>
+    <cs:effectRef idx="0"/>
+    <cs:fontRef idx="minor">
+      <a:schemeClr val="tx1">
+        <a:lumMod val="65000"/>
+        <a:lumOff val="35000"/>
+      </a:schemeClr>
+    </cs:fontRef>
+    <cs:spPr>
+      <a:noFill/>
+      <a:ln w="9525" cap="flat" cmpd="sng" algn="ctr">
+        <a:solidFill>
+          <a:schemeClr val="tx1">
+            <a:lumMod val="15000"/>
+            <a:lumOff val="85000"/>
+          </a:schemeClr>
+        </a:solidFill>
+        <a:round/>
+      </a:ln>
+    </cs:spPr>
+    <cs:defRPr sz="900" kern="1200"/>
+  </cs:dataTable>
+  <cs:downBar>
+    <cs:lnRef idx="0"/>
+    <cs:fillRef idx="0"/>
+    <cs:effectRef idx="0"/>
+    <cs:fontRef idx="minor">
+      <a:schemeClr val="tx1"/>
+    </cs:fontRef>
+    <cs:spPr>
+      <a:solidFill>
+        <a:schemeClr val="dk1">
+          <a:lumMod val="75000"/>
+          <a:lumOff val="25000"/>
+        </a:schemeClr>
+      </a:solidFill>
+      <a:ln w="9525" cap="flat" cmpd="sng" algn="ctr">
+        <a:solidFill>
+          <a:schemeClr val="tx1">
+            <a:lumMod val="65000"/>
+            <a:lumOff val="35000"/>
+          </a:schemeClr>
+        </a:solidFill>
+        <a:round/>
+      </a:ln>
+    </cs:spPr>
+  </cs:downBar>
+  <cs:dropLine>
+    <cs:lnRef idx="0"/>
+    <cs:fillRef idx="0"/>
+    <cs:effectRef idx="0"/>
+    <cs:fontRef idx="minor">
+      <a:schemeClr val="tx1"/>
+    </cs:fontRef>
+    <cs:spPr>
+      <a:ln w="9525" cap="flat" cmpd="sng" algn="ctr">
+        <a:solidFill>
+          <a:schemeClr val="tx1">
+            <a:lumMod val="35000"/>
+            <a:lumOff val="65000"/>
+          </a:schemeClr>
+        </a:solidFill>
+        <a:round/>
+      </a:ln>
+    </cs:spPr>
+  </cs:dropLine>
+  <cs:errorBar>
+    <cs:lnRef idx="0"/>
+    <cs:fillRef idx="0"/>
+    <cs:effectRef idx="0"/>
+    <cs:fontRef idx="minor">
+      <a:schemeClr val="tx1"/>
+    </cs:fontRef>
+    <cs:spPr>
+      <a:ln w="9525" cap="flat" cmpd="sng" algn="ctr">
+        <a:solidFill>
+          <a:schemeClr val="tx1">
+            <a:lumMod val="65000"/>
+            <a:lumOff val="35000"/>
+          </a:schemeClr>
+        </a:solidFill>
+        <a:round/>
+      </a:ln>
+    </cs:spPr>
+  </cs:errorBar>
+  <cs:floor>
+    <cs:lnRef idx="0"/>
+    <cs:fillRef idx="0"/>
+    <cs:effectRef idx="0"/>
+    <cs:fontRef idx="minor">
+      <a:schemeClr val="tx1"/>
+    </cs:fontRef>
+    <cs:spPr>
+      <a:noFill/>
+      <a:ln>
+        <a:noFill/>
+      </a:ln>
+    </cs:spPr>
+  </cs:floor>
+  <cs:gridlineMajor>
+    <cs:lnRef idx="0"/>
+    <cs:fillRef idx="0"/>
+    <cs:effectRef idx="0"/>
+    <cs:fontRef idx="minor">
+      <a:schemeClr val="tx1"/>
+    </cs:fontRef>
+    <cs:spPr>
+      <a:ln w="9525" cap="flat" cmpd="sng" algn="ctr">
+        <a:solidFill>
+          <a:schemeClr val="tx1">
+            <a:lumMod val="15000"/>
+            <a:lumOff val="85000"/>
+          </a:schemeClr>
+        </a:solidFill>
+        <a:round/>
+      </a:ln>
+    </cs:spPr>
+  </cs:gridlineMajor>
+  <cs:gridlineMinor>
+    <cs:lnRef idx="0"/>
+    <cs:fillRef idx="0"/>
+    <cs:effectRef idx="0"/>
+    <cs:fontRef idx="minor">
+      <a:schemeClr val="tx1"/>
+    </cs:fontRef>
+    <cs:spPr>
+      <a:ln w="9525" cap="flat" cmpd="sng" algn="ctr">
+        <a:solidFill>
+          <a:schemeClr val="tx1">
+            <a:lumMod val="5000"/>
+            <a:lumOff val="95000"/>
+          </a:schemeClr>
+        </a:solidFill>
+        <a:round/>
+      </a:ln>
+    </cs:spPr>
+  </cs:gridlineMinor>
+  <cs:hiLoLine>
+    <cs:lnRef idx="0"/>
+    <cs:fillRef idx="0"/>
+    <cs:effectRef idx="0"/>
+    <cs:fontRef idx="minor">
+      <a:schemeClr val="tx1"/>
+    </cs:fontRef>
+    <cs:spPr>
+      <a:ln w="9525" cap="flat" cmpd="sng" algn="ctr">
+        <a:solidFill>
+          <a:schemeClr val="tx1">
+            <a:lumMod val="50000"/>
+            <a:lumOff val="50000"/>
+          </a:schemeClr>
+        </a:solidFill>
+        <a:round/>
+      </a:ln>
+    </cs:spPr>
+  </cs:hiLoLine>
+  <cs:leaderLine>
+    <cs:lnRef idx="0"/>
+    <cs:fillRef idx="0"/>
+    <cs:effectRef idx="0"/>
+    <cs:fontRef idx="minor">
+      <a:schemeClr val="tx1"/>
+    </cs:fontRef>
+    <cs:spPr>
+      <a:ln w="9525" cap="flat" cmpd="sng" algn="ctr">
+        <a:solidFill>
+          <a:schemeClr val="tx1">
+            <a:lumMod val="35000"/>
+            <a:lumOff val="65000"/>
+          </a:schemeClr>
+        </a:solidFill>
+        <a:round/>
+      </a:ln>
+    </cs:spPr>
+  </cs:leaderLine>
+  <cs:legend>
+    <cs:lnRef idx="0"/>
+    <cs:fillRef idx="0"/>
+    <cs:effectRef idx="0"/>
+    <cs:fontRef idx="minor">
+      <a:schemeClr val="tx1">
+        <a:lumMod val="65000"/>
+        <a:lumOff val="35000"/>
+      </a:schemeClr>
+    </cs:fontRef>
+    <cs:defRPr sz="900" kern="1200"/>
+  </cs:legend>
+  <cs:plotArea mods="allowNoFillOverride allowNoLineOverride">
+    <cs:lnRef idx="0"/>
+    <cs:fillRef idx="0"/>
+    <cs:effectRef idx="0"/>
+    <cs:fontRef idx="minor">
+      <a:schemeClr val="tx1"/>
+    </cs:fontRef>
+  </cs:plotArea>
+  <cs:plotArea3D mods="allowNoFillOverride allowNoLineOverride">
+    <cs:lnRef idx="0"/>
+    <cs:fillRef idx="0"/>
+    <cs:effectRef idx="0"/>
+    <cs:fontRef idx="minor">
+      <a:schemeClr val="tx1"/>
+    </cs:fontRef>
+  </cs:plotArea3D>
+  <cs:seriesAxis>
+    <cs:lnRef idx="0"/>
+    <cs:fillRef idx="0"/>
+    <cs:effectRef idx="0"/>
+    <cs:fontRef idx="minor">
+      <a:schemeClr val="tx1">
+        <a:lumMod val="65000"/>
+        <a:lumOff val="35000"/>
+      </a:schemeClr>
+    </cs:fontRef>
+    <cs:defRPr sz="900" kern="1200"/>
+  </cs:seriesAxis>
+  <cs:seriesLine>
+    <cs:lnRef idx="0"/>
+    <cs:fillRef idx="0"/>
+    <cs:effectRef idx="0"/>
+    <cs:fontRef idx="minor">
+      <a:schemeClr val="tx1"/>
+    </cs:fontRef>
+    <cs:spPr>
+      <a:ln w="9525" cap="flat" cmpd="sng" algn="ctr">
+        <a:solidFill>
+          <a:schemeClr val="tx1">
+            <a:lumMod val="35000"/>
+            <a:lumOff val="65000"/>
+          </a:schemeClr>
+        </a:solidFill>
+        <a:round/>
+      </a:ln>
+    </cs:spPr>
+  </cs:seriesLine>
+  <cs:title>
+    <cs:lnRef idx="0"/>
+    <cs:fillRef idx="0"/>
+    <cs:effectRef idx="0"/>
+    <cs:fontRef idx="minor">
+      <a:schemeClr val="tx1">
+        <a:lumMod val="65000"/>
+        <a:lumOff val="35000"/>
+      </a:schemeClr>
+    </cs:fontRef>
+    <cs:defRPr sz="1400" b="0" kern="1200" spc="0" baseline="0"/>
+  </cs:title>
+  <cs:trendline>
+    <cs:lnRef idx="0">
+      <cs:styleClr val="auto"/>
+    </cs:lnRef>
+    <cs:fillRef idx="0"/>
+    <cs:effectRef idx="0"/>
+    <cs:fontRef idx="minor">
+      <a:schemeClr val="tx1"/>
+    </cs:fontRef>
+    <cs:spPr>
+      <a:ln w="19050" cap="rnd">
+        <a:solidFill>
+          <a:schemeClr val="phClr"/>
+        </a:solidFill>
+        <a:prstDash val="sysDot"/>
+      </a:ln>
+    </cs:spPr>
+  </cs:trendline>
+  <cs:trendlineLabel>
+    <cs:lnRef idx="0"/>
+    <cs:fillRef idx="0"/>
+    <cs:effectRef idx="0"/>
+    <cs:fontRef idx="minor">
+      <a:schemeClr val="tx1">
+        <a:lumMod val="65000"/>
+        <a:lumOff val="35000"/>
+      </a:schemeClr>
+    </cs:fontRef>
+    <cs:defRPr sz="900" kern="1200"/>
+  </cs:trendlineLabel>
+  <cs:upBar>
+    <cs:lnRef idx="0"/>
+    <cs:fillRef idx="0"/>
+    <cs:effectRef idx="0"/>
+    <cs:fontRef idx="minor">
+      <a:schemeClr val="tx1"/>
+    </cs:fontRef>
+    <cs:spPr>
+      <a:solidFill>
+        <a:schemeClr val="lt1"/>
+      </a:solidFill>
+      <a:ln w="9525" cap="flat" cmpd="sng" algn="ctr">
+        <a:solidFill>
+          <a:schemeClr val="tx1">
+            <a:lumMod val="65000"/>
+            <a:lumOff val="35000"/>
+          </a:schemeClr>
+        </a:solidFill>
+        <a:round/>
+      </a:ln>
+    </cs:spPr>
+  </cs:upBar>
+  <cs:valueAxis>
+    <cs:lnRef idx="0"/>
+    <cs:fillRef idx="0"/>
+    <cs:effectRef idx="0"/>
+    <cs:fontRef idx="minor">
+      <a:schemeClr val="tx1">
+        <a:lumMod val="65000"/>
+        <a:lumOff val="35000"/>
+      </a:schemeClr>
+    </cs:fontRef>
+    <cs:spPr>
+      <a:ln w="9525" cap="flat" cmpd="sng" algn="ctr">
+        <a:solidFill>
+          <a:schemeClr val="tx1">
+            <a:lumMod val="25000"/>
+            <a:lumOff val="75000"/>
+          </a:schemeClr>
+        </a:solidFill>
+        <a:round/>
+      </a:ln>
+    </cs:spPr>
+    <cs:defRPr sz="900" kern="1200"/>
+  </cs:valueAxis>
+  <cs:wall>
+    <cs:lnRef idx="0"/>
+    <cs:fillRef idx="0"/>
+    <cs:effectRef idx="0"/>
+    <cs:fontRef idx="minor">
+      <a:schemeClr val="tx1"/>
+    </cs:fontRef>
+    <cs:spPr>
+      <a:noFill/>
+      <a:ln>
+        <a:noFill/>
+      </a:ln>
+    </cs:spPr>
+  </cs:wall>
+</cs:chartStyle>
 </file>
 
 <file path=ppt/slideLayouts/slideLayout1.xml><?xml version="1.0" encoding="utf-8"?>
@@ -255,7 +1357,7 @@
           <a:p>
             <a:fld id="{1855F7FB-053A-442B-97E1-F46BC341F4A1}" type="datetimeFigureOut">
               <a:rPr lang="en-US" smtClean="0"/>
-              <a:t>10/6/2019</a:t>
+              <a:t>10/9/19</a:t>
             </a:fld>
             <a:endParaRPr lang="en-US"/>
           </a:p>
@@ -453,7 +1555,7 @@
           <a:p>
             <a:fld id="{1855F7FB-053A-442B-97E1-F46BC341F4A1}" type="datetimeFigureOut">
               <a:rPr lang="en-US" smtClean="0"/>
-              <a:t>10/6/2019</a:t>
+              <a:t>10/9/19</a:t>
             </a:fld>
             <a:endParaRPr lang="en-US"/>
           </a:p>
@@ -661,7 +1763,7 @@
           <a:p>
             <a:fld id="{1855F7FB-053A-442B-97E1-F46BC341F4A1}" type="datetimeFigureOut">
               <a:rPr lang="en-US" smtClean="0"/>
-              <a:t>10/6/2019</a:t>
+              <a:t>10/9/19</a:t>
             </a:fld>
             <a:endParaRPr lang="en-US"/>
           </a:p>
@@ -859,7 +1961,7 @@
           <a:p>
             <a:fld id="{1855F7FB-053A-442B-97E1-F46BC341F4A1}" type="datetimeFigureOut">
               <a:rPr lang="en-US" smtClean="0"/>
-              <a:t>10/6/2019</a:t>
+              <a:t>10/9/19</a:t>
             </a:fld>
             <a:endParaRPr lang="en-US"/>
           </a:p>
@@ -1134,7 +2236,7 @@
           <a:p>
             <a:fld id="{1855F7FB-053A-442B-97E1-F46BC341F4A1}" type="datetimeFigureOut">
               <a:rPr lang="en-US" smtClean="0"/>
-              <a:t>10/6/2019</a:t>
+              <a:t>10/9/19</a:t>
             </a:fld>
             <a:endParaRPr lang="en-US"/>
           </a:p>
@@ -1399,7 +2501,7 @@
           <a:p>
             <a:fld id="{1855F7FB-053A-442B-97E1-F46BC341F4A1}" type="datetimeFigureOut">
               <a:rPr lang="en-US" smtClean="0"/>
-              <a:t>10/6/2019</a:t>
+              <a:t>10/9/19</a:t>
             </a:fld>
             <a:endParaRPr lang="en-US"/>
           </a:p>
@@ -1811,7 +2913,7 @@
           <a:p>
             <a:fld id="{1855F7FB-053A-442B-97E1-F46BC341F4A1}" type="datetimeFigureOut">
               <a:rPr lang="en-US" smtClean="0"/>
-              <a:t>10/6/2019</a:t>
+              <a:t>10/9/19</a:t>
             </a:fld>
             <a:endParaRPr lang="en-US"/>
           </a:p>
@@ -1952,7 +3054,7 @@
           <a:p>
             <a:fld id="{1855F7FB-053A-442B-97E1-F46BC341F4A1}" type="datetimeFigureOut">
               <a:rPr lang="en-US" smtClean="0"/>
-              <a:t>10/6/2019</a:t>
+              <a:t>10/9/19</a:t>
             </a:fld>
             <a:endParaRPr lang="en-US"/>
           </a:p>
@@ -2065,7 +3167,7 @@
           <a:p>
             <a:fld id="{1855F7FB-053A-442B-97E1-F46BC341F4A1}" type="datetimeFigureOut">
               <a:rPr lang="en-US" smtClean="0"/>
-              <a:t>10/6/2019</a:t>
+              <a:t>10/9/19</a:t>
             </a:fld>
             <a:endParaRPr lang="en-US"/>
           </a:p>
@@ -2376,7 +3478,7 @@
           <a:p>
             <a:fld id="{1855F7FB-053A-442B-97E1-F46BC341F4A1}" type="datetimeFigureOut">
               <a:rPr lang="en-US" smtClean="0"/>
-              <a:t>10/6/2019</a:t>
+              <a:t>10/9/19</a:t>
             </a:fld>
             <a:endParaRPr lang="en-US"/>
           </a:p>
@@ -2664,7 +3766,7 @@
           <a:p>
             <a:fld id="{1855F7FB-053A-442B-97E1-F46BC341F4A1}" type="datetimeFigureOut">
               <a:rPr lang="en-US" smtClean="0"/>
-              <a:t>10/6/2019</a:t>
+              <a:t>10/9/19</a:t>
             </a:fld>
             <a:endParaRPr lang="en-US"/>
           </a:p>
@@ -2905,7 +4007,7 @@
           <a:p>
             <a:fld id="{1855F7FB-053A-442B-97E1-F46BC341F4A1}" type="datetimeFigureOut">
               <a:rPr lang="en-US" smtClean="0"/>
-              <a:t>10/6/2019</a:t>
+              <a:t>10/9/19</a:t>
             </a:fld>
             <a:endParaRPr lang="en-US"/>
           </a:p>
@@ -8818,6 +9920,561 @@
 </p:sld>
 </file>
 
+<file path=ppt/slides/slide3.xml><?xml version="1.0" encoding="utf-8"?>
+<p:sld xmlns:a="http://schemas.openxmlformats.org/drawingml/2006/main" xmlns:r="http://schemas.openxmlformats.org/officeDocument/2006/relationships" xmlns:p="http://schemas.openxmlformats.org/presentationml/2006/main">
+  <p:cSld>
+    <p:spTree>
+      <p:nvGrpSpPr>
+        <p:cNvPr id="1" name=""/>
+        <p:cNvGrpSpPr/>
+        <p:nvPr/>
+      </p:nvGrpSpPr>
+      <p:grpSpPr>
+        <a:xfrm>
+          <a:off x="0" y="0"/>
+          <a:ext cx="0" cy="0"/>
+          <a:chOff x="0" y="0"/>
+          <a:chExt cx="0" cy="0"/>
+        </a:xfrm>
+      </p:grpSpPr>
+      <p:sp>
+        <p:nvSpPr>
+          <p:cNvPr id="2" name="TextBox 1"/>
+          <p:cNvSpPr txBox="1"/>
+          <p:nvPr/>
+        </p:nvSpPr>
+        <p:spPr>
+          <a:xfrm>
+            <a:off x="224052" y="130837"/>
+            <a:ext cx="11246059" cy="666786"/>
+          </a:xfrm>
+          <a:prstGeom prst="rect">
+            <a:avLst/>
+          </a:prstGeom>
+          <a:noFill/>
+        </p:spPr>
+        <p:txBody>
+          <a:bodyPr wrap="square" rtlCol="0">
+            <a:spAutoFit/>
+          </a:bodyPr>
+          <a:lstStyle/>
+          <a:p>
+            <a:pPr algn="ctr"/>
+            <a:r>
+              <a:rPr lang="en-GB" sz="3733" b="1" dirty="0">
+                <a:solidFill>
+                  <a:schemeClr val="tx2"/>
+                </a:solidFill>
+                <a:latin typeface="Calibri" panose="020F0502020204030204" pitchFamily="34" charset="0"/>
+                <a:cs typeface="Calibri" panose="020F0502020204030204" pitchFamily="34" charset="0"/>
+              </a:rPr>
+              <a:t>Parallelization Strategy: Network Partitioning</a:t>
+            </a:r>
+          </a:p>
+        </p:txBody>
+      </p:sp>
+      <p:pic>
+        <p:nvPicPr>
+          <p:cNvPr id="19" name="Content Placeholder 18">
+            <a:extLst>
+              <a:ext uri="{FF2B5EF4-FFF2-40B4-BE49-F238E27FC236}">
+                <a16:creationId xmlns:a16="http://schemas.microsoft.com/office/drawing/2014/main" id="{B06F0E09-60B8-0640-8E7A-C0D1E6C1952C}"/>
+              </a:ext>
+            </a:extLst>
+          </p:cNvPr>
+          <p:cNvPicPr>
+            <a:picLocks noGrp="1" noChangeAspect="1"/>
+          </p:cNvPicPr>
+          <p:nvPr>
+            <p:ph sz="quarter" idx="4"/>
+          </p:nvPr>
+        </p:nvPicPr>
+        <p:blipFill>
+          <a:blip r:embed="rId2">
+            <a:extLst>
+              <a:ext uri="{28A0092B-C50C-407E-A947-70E740481C1C}">
+                <a14:useLocalDpi xmlns:a14="http://schemas.microsoft.com/office/drawing/2010/main" val="0"/>
+              </a:ext>
+            </a:extLst>
+          </a:blip>
+          <a:stretch>
+            <a:fillRect/>
+          </a:stretch>
+        </p:blipFill>
+        <p:spPr>
+          <a:xfrm>
+            <a:off x="1542175" y="997771"/>
+            <a:ext cx="8609815" cy="5591384"/>
+          </a:xfrm>
+        </p:spPr>
+      </p:pic>
+    </p:spTree>
+    <p:extLst>
+      <p:ext uri="{BB962C8B-B14F-4D97-AF65-F5344CB8AC3E}">
+        <p14:creationId xmlns:p14="http://schemas.microsoft.com/office/powerpoint/2010/main" val="2327656850"/>
+      </p:ext>
+    </p:extLst>
+  </p:cSld>
+  <p:clrMapOvr>
+    <a:masterClrMapping/>
+  </p:clrMapOvr>
+  <mc:AlternateContent xmlns:mc="http://schemas.openxmlformats.org/markup-compatibility/2006" xmlns:p14="http://schemas.microsoft.com/office/powerpoint/2010/main">
+    <mc:Choice Requires="p14">
+      <p:transition spd="slow" p14:dur="2000" advTm="65000"/>
+    </mc:Choice>
+    <mc:Fallback xmlns="">
+      <p:transition xmlns:p14="http://schemas.microsoft.com/office/powerpoint/2010/main" spd="slow" advTm="65000"/>
+    </mc:Fallback>
+  </mc:AlternateContent>
+</p:sld>
+</file>
+
+<file path=ppt/slides/slide4.xml><?xml version="1.0" encoding="utf-8"?>
+<p:sld xmlns:a="http://schemas.openxmlformats.org/drawingml/2006/main" xmlns:r="http://schemas.openxmlformats.org/officeDocument/2006/relationships" xmlns:p="http://schemas.openxmlformats.org/presentationml/2006/main">
+  <p:cSld>
+    <p:spTree>
+      <p:nvGrpSpPr>
+        <p:cNvPr id="1" name=""/>
+        <p:cNvGrpSpPr/>
+        <p:nvPr/>
+      </p:nvGrpSpPr>
+      <p:grpSpPr>
+        <a:xfrm>
+          <a:off x="0" y="0"/>
+          <a:ext cx="0" cy="0"/>
+          <a:chOff x="0" y="0"/>
+          <a:chExt cx="0" cy="0"/>
+        </a:xfrm>
+      </p:grpSpPr>
+      <p:sp>
+        <p:nvSpPr>
+          <p:cNvPr id="2" name="TextBox 1"/>
+          <p:cNvSpPr txBox="1"/>
+          <p:nvPr/>
+        </p:nvSpPr>
+        <p:spPr>
+          <a:xfrm>
+            <a:off x="501303" y="187089"/>
+            <a:ext cx="11246059" cy="1241237"/>
+          </a:xfrm>
+          <a:prstGeom prst="rect">
+            <a:avLst/>
+          </a:prstGeom>
+          <a:noFill/>
+        </p:spPr>
+        <p:txBody>
+          <a:bodyPr wrap="square" rtlCol="0">
+            <a:spAutoFit/>
+          </a:bodyPr>
+          <a:lstStyle/>
+          <a:p>
+            <a:r>
+              <a:rPr lang="en-GB" sz="3733" b="1" dirty="0">
+                <a:solidFill>
+                  <a:schemeClr val="tx2"/>
+                </a:solidFill>
+                <a:latin typeface="Calibri" panose="020F0502020204030204" pitchFamily="34" charset="0"/>
+                <a:cs typeface="Calibri" panose="020F0502020204030204" pitchFamily="34" charset="0"/>
+              </a:rPr>
+              <a:t>Results: Parallel simulation attains considerable speed up</a:t>
+            </a:r>
+          </a:p>
+        </p:txBody>
+      </p:sp>
+      <p:sp>
+        <p:nvSpPr>
+          <p:cNvPr id="20" name="Content Placeholder 8">
+            <a:extLst>
+              <a:ext uri="{FF2B5EF4-FFF2-40B4-BE49-F238E27FC236}">
+                <a16:creationId xmlns:a16="http://schemas.microsoft.com/office/drawing/2014/main" id="{4F7AF12A-D04F-7043-8B14-8E589CC6E282}"/>
+              </a:ext>
+            </a:extLst>
+          </p:cNvPr>
+          <p:cNvSpPr txBox="1">
+            <a:spLocks/>
+          </p:cNvSpPr>
+          <p:nvPr/>
+        </p:nvSpPr>
+        <p:spPr>
+          <a:xfrm>
+            <a:off x="495202" y="5198527"/>
+            <a:ext cx="10955225" cy="1419275"/>
+          </a:xfrm>
+          <a:prstGeom prst="rect">
+            <a:avLst/>
+          </a:prstGeom>
+        </p:spPr>
+        <p:txBody>
+          <a:bodyPr>
+            <a:noAutofit/>
+          </a:bodyPr>
+          <a:lstStyle>
+            <a:lvl1pPr marL="228600" indent="-182880" algn="l" defTabSz="914400" rtl="0" eaLnBrk="1" latinLnBrk="0" hangingPunct="1">
+              <a:spcBef>
+                <a:spcPct val="20000"/>
+              </a:spcBef>
+              <a:spcAft>
+                <a:spcPts val="300"/>
+              </a:spcAft>
+              <a:buClr>
+                <a:schemeClr val="accent6">
+                  <a:lumMod val="75000"/>
+                </a:schemeClr>
+              </a:buClr>
+              <a:buSzPct val="130000"/>
+              <a:buFont typeface="Georgia" pitchFamily="18" charset="0"/>
+              <a:buChar char="*"/>
+              <a:defRPr sz="2200" b="0" i="0" kern="1200">
+                <a:solidFill>
+                  <a:schemeClr val="tx1">
+                    <a:lumMod val="75000"/>
+                    <a:lumOff val="25000"/>
+                  </a:schemeClr>
+                </a:solidFill>
+                <a:latin typeface="Raleway Medium"/>
+                <a:ea typeface="+mn-ea"/>
+                <a:cs typeface="Raleway Medium"/>
+              </a:defRPr>
+            </a:lvl1pPr>
+            <a:lvl2pPr marL="548640" indent="-182880" algn="l" defTabSz="914400" rtl="0" eaLnBrk="1" latinLnBrk="0" hangingPunct="1">
+              <a:spcBef>
+                <a:spcPct val="20000"/>
+              </a:spcBef>
+              <a:spcAft>
+                <a:spcPts val="300"/>
+              </a:spcAft>
+              <a:buClr>
+                <a:schemeClr val="accent6">
+                  <a:lumMod val="75000"/>
+                </a:schemeClr>
+              </a:buClr>
+              <a:buSzPct val="130000"/>
+              <a:buFont typeface="Georgia" pitchFamily="18" charset="0"/>
+              <a:buChar char="*"/>
+              <a:defRPr sz="2000" b="0" i="0" kern="1200">
+                <a:solidFill>
+                  <a:schemeClr val="tx1">
+                    <a:lumMod val="75000"/>
+                    <a:lumOff val="25000"/>
+                  </a:schemeClr>
+                </a:solidFill>
+                <a:latin typeface="Raleway Medium"/>
+                <a:ea typeface="+mn-ea"/>
+                <a:cs typeface="Raleway Medium"/>
+              </a:defRPr>
+            </a:lvl2pPr>
+            <a:lvl3pPr marL="822960" indent="-182880" algn="l" defTabSz="914400" rtl="0" eaLnBrk="1" latinLnBrk="0" hangingPunct="1">
+              <a:spcBef>
+                <a:spcPct val="20000"/>
+              </a:spcBef>
+              <a:spcAft>
+                <a:spcPts val="300"/>
+              </a:spcAft>
+              <a:buClr>
+                <a:schemeClr val="accent6">
+                  <a:lumMod val="75000"/>
+                </a:schemeClr>
+              </a:buClr>
+              <a:buSzPct val="130000"/>
+              <a:buFont typeface="Georgia" pitchFamily="18" charset="0"/>
+              <a:buChar char="*"/>
+              <a:defRPr sz="1800" b="0" i="0" kern="1200">
+                <a:solidFill>
+                  <a:schemeClr val="tx1">
+                    <a:lumMod val="75000"/>
+                    <a:lumOff val="25000"/>
+                  </a:schemeClr>
+                </a:solidFill>
+                <a:latin typeface="Raleway Medium"/>
+                <a:ea typeface="+mn-ea"/>
+                <a:cs typeface="Raleway Medium"/>
+              </a:defRPr>
+            </a:lvl3pPr>
+            <a:lvl4pPr marL="1097280" indent="-182880" algn="l" defTabSz="914400" rtl="0" eaLnBrk="1" latinLnBrk="0" hangingPunct="1">
+              <a:spcBef>
+                <a:spcPct val="20000"/>
+              </a:spcBef>
+              <a:spcAft>
+                <a:spcPts val="300"/>
+              </a:spcAft>
+              <a:buClr>
+                <a:schemeClr val="accent6">
+                  <a:lumMod val="75000"/>
+                </a:schemeClr>
+              </a:buClr>
+              <a:buSzPct val="130000"/>
+              <a:buFont typeface="Georgia" pitchFamily="18" charset="0"/>
+              <a:buChar char="*"/>
+              <a:defRPr sz="1600" b="0" i="0" kern="1200">
+                <a:solidFill>
+                  <a:schemeClr val="tx1">
+                    <a:lumMod val="75000"/>
+                    <a:lumOff val="25000"/>
+                  </a:schemeClr>
+                </a:solidFill>
+                <a:latin typeface="Raleway Medium"/>
+                <a:ea typeface="+mn-ea"/>
+                <a:cs typeface="Raleway Medium"/>
+              </a:defRPr>
+            </a:lvl4pPr>
+            <a:lvl5pPr marL="1389888" indent="-182880" algn="l" defTabSz="914400" rtl="0" eaLnBrk="1" latinLnBrk="0" hangingPunct="1">
+              <a:spcBef>
+                <a:spcPct val="20000"/>
+              </a:spcBef>
+              <a:spcAft>
+                <a:spcPts val="300"/>
+              </a:spcAft>
+              <a:buClr>
+                <a:schemeClr val="accent6">
+                  <a:lumMod val="75000"/>
+                </a:schemeClr>
+              </a:buClr>
+              <a:buSzPct val="130000"/>
+              <a:buFont typeface="Georgia" pitchFamily="18" charset="0"/>
+              <a:buChar char="*"/>
+              <a:defRPr sz="1400" b="0" i="0" kern="1200">
+                <a:solidFill>
+                  <a:schemeClr val="tx1">
+                    <a:lumMod val="75000"/>
+                    <a:lumOff val="25000"/>
+                  </a:schemeClr>
+                </a:solidFill>
+                <a:latin typeface="Raleway Medium"/>
+                <a:ea typeface="+mn-ea"/>
+                <a:cs typeface="Raleway Medium"/>
+              </a:defRPr>
+            </a:lvl5pPr>
+            <a:lvl6pPr marL="1664208" indent="-182880" algn="l" defTabSz="914400" rtl="0" eaLnBrk="1" latinLnBrk="0" hangingPunct="1">
+              <a:spcBef>
+                <a:spcPct val="20000"/>
+              </a:spcBef>
+              <a:spcAft>
+                <a:spcPts val="300"/>
+              </a:spcAft>
+              <a:buClr>
+                <a:schemeClr val="accent6">
+                  <a:lumMod val="75000"/>
+                </a:schemeClr>
+              </a:buClr>
+              <a:buSzPct val="130000"/>
+              <a:buFont typeface="Georgia" pitchFamily="18" charset="0"/>
+              <a:buChar char="*"/>
+              <a:defRPr sz="1400" kern="1200">
+                <a:solidFill>
+                  <a:schemeClr val="tx1">
+                    <a:lumMod val="75000"/>
+                    <a:lumOff val="25000"/>
+                  </a:schemeClr>
+                </a:solidFill>
+                <a:latin typeface="+mn-lt"/>
+                <a:ea typeface="+mn-ea"/>
+                <a:cs typeface="+mn-cs"/>
+              </a:defRPr>
+            </a:lvl6pPr>
+            <a:lvl7pPr marL="1965960" indent="-182880" algn="l" defTabSz="914400" rtl="0" eaLnBrk="1" latinLnBrk="0" hangingPunct="1">
+              <a:spcBef>
+                <a:spcPct val="20000"/>
+              </a:spcBef>
+              <a:spcAft>
+                <a:spcPts val="300"/>
+              </a:spcAft>
+              <a:buClr>
+                <a:schemeClr val="accent6">
+                  <a:lumMod val="75000"/>
+                </a:schemeClr>
+              </a:buClr>
+              <a:buSzPct val="130000"/>
+              <a:buFont typeface="Georgia" pitchFamily="18" charset="0"/>
+              <a:buChar char="*"/>
+              <a:defRPr sz="1400" kern="1200">
+                <a:solidFill>
+                  <a:schemeClr val="tx1">
+                    <a:lumMod val="75000"/>
+                    <a:lumOff val="25000"/>
+                  </a:schemeClr>
+                </a:solidFill>
+                <a:latin typeface="+mn-lt"/>
+                <a:ea typeface="+mn-ea"/>
+                <a:cs typeface="+mn-cs"/>
+              </a:defRPr>
+            </a:lvl7pPr>
+            <a:lvl8pPr marL="2286000" indent="-182880" algn="l" defTabSz="914400" rtl="0" eaLnBrk="1" latinLnBrk="0" hangingPunct="1">
+              <a:spcBef>
+                <a:spcPct val="20000"/>
+              </a:spcBef>
+              <a:spcAft>
+                <a:spcPts val="300"/>
+              </a:spcAft>
+              <a:buClr>
+                <a:schemeClr val="accent6">
+                  <a:lumMod val="75000"/>
+                </a:schemeClr>
+              </a:buClr>
+              <a:buSzPct val="130000"/>
+              <a:buFont typeface="Georgia" pitchFamily="18" charset="0"/>
+              <a:buChar char="*"/>
+              <a:defRPr sz="1400" kern="1200">
+                <a:solidFill>
+                  <a:schemeClr val="tx1">
+                    <a:lumMod val="75000"/>
+                    <a:lumOff val="25000"/>
+                  </a:schemeClr>
+                </a:solidFill>
+                <a:latin typeface="+mn-lt"/>
+                <a:ea typeface="+mn-ea"/>
+                <a:cs typeface="+mn-cs"/>
+              </a:defRPr>
+            </a:lvl8pPr>
+            <a:lvl9pPr marL="2587752" indent="-182880" algn="l" defTabSz="914400" rtl="0" eaLnBrk="1" latinLnBrk="0" hangingPunct="1">
+              <a:spcBef>
+                <a:spcPct val="20000"/>
+              </a:spcBef>
+              <a:spcAft>
+                <a:spcPts val="300"/>
+              </a:spcAft>
+              <a:buClr>
+                <a:schemeClr val="accent6">
+                  <a:lumMod val="75000"/>
+                </a:schemeClr>
+              </a:buClr>
+              <a:buSzPct val="130000"/>
+              <a:buFont typeface="Georgia" pitchFamily="18" charset="0"/>
+              <a:buChar char="*"/>
+              <a:defRPr sz="1400" kern="1200">
+                <a:solidFill>
+                  <a:schemeClr val="tx1">
+                    <a:lumMod val="75000"/>
+                    <a:lumOff val="25000"/>
+                  </a:schemeClr>
+                </a:solidFill>
+                <a:latin typeface="+mn-lt"/>
+                <a:ea typeface="+mn-ea"/>
+                <a:cs typeface="+mn-cs"/>
+              </a:defRPr>
+            </a:lvl9pPr>
+          </a:lstStyle>
+          <a:p>
+            <a:r>
+              <a:rPr lang="en-US" sz="1800" dirty="0">
+                <a:latin typeface="Calibri" panose="020F0502020204030204" pitchFamily="34" charset="0"/>
+                <a:cs typeface="Calibri" panose="020F0502020204030204" pitchFamily="34" charset="0"/>
+              </a:rPr>
+              <a:t>Run on a synthetic grid-like network with 62500 nodes, 170000 Links, and 12500 origin-destination pairs.</a:t>
+            </a:r>
+          </a:p>
+          <a:p>
+            <a:r>
+              <a:rPr lang="en-US" sz="1800" dirty="0">
+                <a:latin typeface="Calibri" panose="020F0502020204030204" pitchFamily="34" charset="0"/>
+                <a:cs typeface="Calibri" panose="020F0502020204030204" pitchFamily="34" charset="0"/>
+              </a:rPr>
+              <a:t>Parallel simulation on 1024 cores: </a:t>
+            </a:r>
+          </a:p>
+          <a:p>
+            <a:pPr lvl="1"/>
+            <a:r>
+              <a:rPr lang="en-US" sz="1800" b="1" dirty="0">
+                <a:latin typeface="Calibri" panose="020F0502020204030204" pitchFamily="34" charset="0"/>
+                <a:cs typeface="Calibri" panose="020F0502020204030204" pitchFamily="34" charset="0"/>
+              </a:rPr>
+              <a:t>475 speed up compared to serial simulation</a:t>
+            </a:r>
+          </a:p>
+          <a:p>
+            <a:pPr lvl="1"/>
+            <a:r>
+              <a:rPr lang="en-US" sz="1800" b="1" dirty="0">
+                <a:latin typeface="Calibri" panose="020F0502020204030204" pitchFamily="34" charset="0"/>
+                <a:cs typeface="Calibri" panose="020F0502020204030204" pitchFamily="34" charset="0"/>
+              </a:rPr>
+              <a:t>Time reduction from 8245 seconds to 17 seconds</a:t>
+            </a:r>
+          </a:p>
+        </p:txBody>
+      </p:sp>
+      <p:pic>
+        <p:nvPicPr>
+          <p:cNvPr id="9" name="Content Placeholder 7">
+            <a:extLst>
+              <a:ext uri="{FF2B5EF4-FFF2-40B4-BE49-F238E27FC236}">
+                <a16:creationId xmlns:a16="http://schemas.microsoft.com/office/drawing/2014/main" id="{783A522C-966F-604B-BCA8-4F4348DE84F0}"/>
+              </a:ext>
+            </a:extLst>
+          </p:cNvPr>
+          <p:cNvPicPr>
+            <a:picLocks noChangeAspect="1"/>
+          </p:cNvPicPr>
+          <p:nvPr/>
+        </p:nvPicPr>
+        <p:blipFill>
+          <a:blip r:embed="rId2"/>
+          <a:stretch>
+            <a:fillRect/>
+          </a:stretch>
+        </p:blipFill>
+        <p:spPr>
+          <a:xfrm>
+            <a:off x="495202" y="934927"/>
+            <a:ext cx="4200260" cy="4200260"/>
+          </a:xfrm>
+          <a:prstGeom prst="rect">
+            <a:avLst/>
+          </a:prstGeom>
+        </p:spPr>
+      </p:pic>
+      <p:graphicFrame>
+        <p:nvGraphicFramePr>
+          <p:cNvPr id="10" name="Content Placeholder 9">
+            <a:extLst>
+              <a:ext uri="{FF2B5EF4-FFF2-40B4-BE49-F238E27FC236}">
+                <a16:creationId xmlns:a16="http://schemas.microsoft.com/office/drawing/2014/main" id="{A645D079-670B-E24D-A731-17A8925F3DBC}"/>
+              </a:ext>
+            </a:extLst>
+          </p:cNvPr>
+          <p:cNvGraphicFramePr>
+            <a:graphicFrameLocks noGrp="1"/>
+          </p:cNvGraphicFramePr>
+          <p:nvPr>
+            <p:ph sz="half" idx="2"/>
+            <p:extLst>
+              <p:ext uri="{D42A27DB-BD31-4B8C-83A1-F6EECF244321}">
+                <p14:modId xmlns:p14="http://schemas.microsoft.com/office/powerpoint/2010/main" val="2158154530"/>
+              </p:ext>
+            </p:extLst>
+          </p:nvPr>
+        </p:nvGraphicFramePr>
+        <p:xfrm>
+          <a:off x="5044040" y="1192763"/>
+          <a:ext cx="5680282" cy="3478628"/>
+        </p:xfrm>
+        <a:graphic>
+          <a:graphicData uri="http://schemas.openxmlformats.org/drawingml/2006/chart">
+            <c:chart xmlns:c="http://schemas.openxmlformats.org/drawingml/2006/chart" xmlns:r="http://schemas.openxmlformats.org/officeDocument/2006/relationships" r:id="rId3"/>
+          </a:graphicData>
+        </a:graphic>
+      </p:graphicFrame>
+    </p:spTree>
+    <p:extLst>
+      <p:ext uri="{BB962C8B-B14F-4D97-AF65-F5344CB8AC3E}">
+        <p14:creationId xmlns:p14="http://schemas.microsoft.com/office/powerpoint/2010/main" val="3034692235"/>
+      </p:ext>
+    </p:extLst>
+  </p:cSld>
+  <p:clrMapOvr>
+    <a:masterClrMapping/>
+  </p:clrMapOvr>
+  <mc:AlternateContent xmlns:mc="http://schemas.openxmlformats.org/markup-compatibility/2006" xmlns:p14="http://schemas.microsoft.com/office/powerpoint/2010/main">
+    <mc:Choice Requires="p14">
+      <p:transition spd="slow" p14:dur="2000" advTm="65000"/>
+    </mc:Choice>
+    <mc:Fallback xmlns="">
+      <p:transition xmlns:p14="http://schemas.microsoft.com/office/powerpoint/2010/main" spd="slow" advTm="65000"/>
+    </mc:Fallback>
+  </mc:AlternateContent>
+</p:sld>
+</file>
+
 <file path=ppt/theme/theme1.xml><?xml version="1.0" encoding="utf-8"?>
 <a:theme xmlns:a="http://schemas.openxmlformats.org/drawingml/2006/main" name="Office Theme">
   <a:themeElements>

</xml_diff>